<commit_message>
Improved the "challanges" and "work separation" sections
</commit_message>
<xml_diff>
--- a/Linked Movie Exploration Graph.pptx
+++ b/Linked Movie Exploration Graph.pptx
@@ -109,6 +109,11 @@
       </a:defRPr>
     </a:lvl9pPr>
   </p:defaultTextStyle>
+  <p:extLst>
+    <p:ext uri="{EFAFB233-063F-42B5-8137-9DF3F51BA10A}">
+      <p15:sldGuideLst xmlns:p15="http://schemas.microsoft.com/office/powerpoint/2012/main"/>
+    </p:ext>
+  </p:extLst>
 </p:presentation>
 </file>
 
@@ -157,7 +162,6 @@
               <a:rPr lang="de-DE"/>
               <a:t>Titelmasterformat durch Klicken bearbeiten</a:t>
             </a:r>
-            <a:endParaRPr lang="de-DE"/>
           </a:p>
         </p:txBody>
       </p:sp>
@@ -222,7 +226,6 @@
               <a:rPr lang="de-DE"/>
               <a:t>Formatvorlage des Untertitelmasters durch Klicken bearbeiten</a:t>
             </a:r>
-            <a:endParaRPr lang="de-DE"/>
           </a:p>
         </p:txBody>
       </p:sp>
@@ -243,7 +246,7 @@
           <a:p>
             <a:fld id="{2107A019-A245-4CF9-8404-4037D2D39BB4}" type="datetimeFigureOut">
               <a:rPr lang="de-DE" smtClean="0"/>
-              <a:t>07.12.2016</a:t>
+              <a:t>12.12.2016</a:t>
             </a:fld>
             <a:endParaRPr lang="de-DE"/>
           </a:p>
@@ -340,7 +343,6 @@
               <a:rPr lang="de-DE"/>
               <a:t>Titelmasterformat durch Klicken bearbeiten</a:t>
             </a:r>
-            <a:endParaRPr lang="de-DE"/>
           </a:p>
         </p:txBody>
       </p:sp>
@@ -392,7 +394,6 @@
               <a:rPr lang="de-DE"/>
               <a:t>Fünfte Ebene</a:t>
             </a:r>
-            <a:endParaRPr lang="de-DE"/>
           </a:p>
         </p:txBody>
       </p:sp>
@@ -413,7 +414,7 @@
           <a:p>
             <a:fld id="{2107A019-A245-4CF9-8404-4037D2D39BB4}" type="datetimeFigureOut">
               <a:rPr lang="de-DE" smtClean="0"/>
-              <a:t>07.12.2016</a:t>
+              <a:t>12.12.2016</a:t>
             </a:fld>
             <a:endParaRPr lang="de-DE"/>
           </a:p>
@@ -515,7 +516,6 @@
               <a:rPr lang="de-DE"/>
               <a:t>Titelmasterformat durch Klicken bearbeiten</a:t>
             </a:r>
-            <a:endParaRPr lang="de-DE"/>
           </a:p>
         </p:txBody>
       </p:sp>
@@ -572,7 +572,6 @@
               <a:rPr lang="de-DE"/>
               <a:t>Fünfte Ebene</a:t>
             </a:r>
-            <a:endParaRPr lang="de-DE"/>
           </a:p>
         </p:txBody>
       </p:sp>
@@ -593,7 +592,7 @@
           <a:p>
             <a:fld id="{2107A019-A245-4CF9-8404-4037D2D39BB4}" type="datetimeFigureOut">
               <a:rPr lang="de-DE" smtClean="0"/>
-              <a:t>07.12.2016</a:t>
+              <a:t>12.12.2016</a:t>
             </a:fld>
             <a:endParaRPr lang="de-DE"/>
           </a:p>
@@ -690,7 +689,6 @@
               <a:rPr lang="de-DE"/>
               <a:t>Titelmasterformat durch Klicken bearbeiten</a:t>
             </a:r>
-            <a:endParaRPr lang="de-DE"/>
           </a:p>
         </p:txBody>
       </p:sp>
@@ -742,7 +740,6 @@
               <a:rPr lang="de-DE"/>
               <a:t>Fünfte Ebene</a:t>
             </a:r>
-            <a:endParaRPr lang="de-DE"/>
           </a:p>
         </p:txBody>
       </p:sp>
@@ -763,7 +760,7 @@
           <a:p>
             <a:fld id="{2107A019-A245-4CF9-8404-4037D2D39BB4}" type="datetimeFigureOut">
               <a:rPr lang="de-DE" smtClean="0"/>
-              <a:t>07.12.2016</a:t>
+              <a:t>12.12.2016</a:t>
             </a:fld>
             <a:endParaRPr lang="de-DE"/>
           </a:p>
@@ -869,7 +866,6 @@
               <a:rPr lang="de-DE"/>
               <a:t>Titelmasterformat durch Klicken bearbeiten</a:t>
             </a:r>
-            <a:endParaRPr lang="de-DE"/>
           </a:p>
         </p:txBody>
       </p:sp>
@@ -1009,7 +1005,7 @@
           <a:p>
             <a:fld id="{2107A019-A245-4CF9-8404-4037D2D39BB4}" type="datetimeFigureOut">
               <a:rPr lang="de-DE" smtClean="0"/>
-              <a:t>07.12.2016</a:t>
+              <a:t>12.12.2016</a:t>
             </a:fld>
             <a:endParaRPr lang="de-DE"/>
           </a:p>
@@ -1106,7 +1102,6 @@
               <a:rPr lang="de-DE"/>
               <a:t>Titelmasterformat durch Klicken bearbeiten</a:t>
             </a:r>
-            <a:endParaRPr lang="de-DE"/>
           </a:p>
         </p:txBody>
       </p:sp>
@@ -1163,7 +1158,6 @@
               <a:rPr lang="de-DE"/>
               <a:t>Fünfte Ebene</a:t>
             </a:r>
-            <a:endParaRPr lang="de-DE"/>
           </a:p>
         </p:txBody>
       </p:sp>
@@ -1220,7 +1214,6 @@
               <a:rPr lang="de-DE"/>
               <a:t>Fünfte Ebene</a:t>
             </a:r>
-            <a:endParaRPr lang="de-DE"/>
           </a:p>
         </p:txBody>
       </p:sp>
@@ -1241,7 +1234,7 @@
           <a:p>
             <a:fld id="{2107A019-A245-4CF9-8404-4037D2D39BB4}" type="datetimeFigureOut">
               <a:rPr lang="de-DE" smtClean="0"/>
-              <a:t>07.12.2016</a:t>
+              <a:t>12.12.2016</a:t>
             </a:fld>
             <a:endParaRPr lang="de-DE"/>
           </a:p>
@@ -1343,7 +1336,6 @@
               <a:rPr lang="de-DE"/>
               <a:t>Titelmasterformat durch Klicken bearbeiten</a:t>
             </a:r>
-            <a:endParaRPr lang="de-DE"/>
           </a:p>
         </p:txBody>
       </p:sp>
@@ -1465,7 +1457,6 @@
               <a:rPr lang="de-DE"/>
               <a:t>Fünfte Ebene</a:t>
             </a:r>
-            <a:endParaRPr lang="de-DE"/>
           </a:p>
         </p:txBody>
       </p:sp>
@@ -1587,7 +1578,6 @@
               <a:rPr lang="de-DE"/>
               <a:t>Fünfte Ebene</a:t>
             </a:r>
-            <a:endParaRPr lang="de-DE"/>
           </a:p>
         </p:txBody>
       </p:sp>
@@ -1608,7 +1598,7 @@
           <a:p>
             <a:fld id="{2107A019-A245-4CF9-8404-4037D2D39BB4}" type="datetimeFigureOut">
               <a:rPr lang="de-DE" smtClean="0"/>
-              <a:t>07.12.2016</a:t>
+              <a:t>12.12.2016</a:t>
             </a:fld>
             <a:endParaRPr lang="de-DE"/>
           </a:p>
@@ -1705,7 +1695,6 @@
               <a:rPr lang="de-DE"/>
               <a:t>Titelmasterformat durch Klicken bearbeiten</a:t>
             </a:r>
-            <a:endParaRPr lang="de-DE"/>
           </a:p>
         </p:txBody>
       </p:sp>
@@ -1726,7 +1715,7 @@
           <a:p>
             <a:fld id="{2107A019-A245-4CF9-8404-4037D2D39BB4}" type="datetimeFigureOut">
               <a:rPr lang="de-DE" smtClean="0"/>
-              <a:t>07.12.2016</a:t>
+              <a:t>12.12.2016</a:t>
             </a:fld>
             <a:endParaRPr lang="de-DE"/>
           </a:p>
@@ -1821,7 +1810,7 @@
           <a:p>
             <a:fld id="{2107A019-A245-4CF9-8404-4037D2D39BB4}" type="datetimeFigureOut">
               <a:rPr lang="de-DE" smtClean="0"/>
-              <a:t>07.12.2016</a:t>
+              <a:t>12.12.2016</a:t>
             </a:fld>
             <a:endParaRPr lang="de-DE"/>
           </a:p>
@@ -1927,7 +1916,6 @@
               <a:rPr lang="de-DE"/>
               <a:t>Titelmasterformat durch Klicken bearbeiten</a:t>
             </a:r>
-            <a:endParaRPr lang="de-DE"/>
           </a:p>
         </p:txBody>
       </p:sp>
@@ -2012,7 +2000,6 @@
               <a:rPr lang="de-DE"/>
               <a:t>Fünfte Ebene</a:t>
             </a:r>
-            <a:endParaRPr lang="de-DE"/>
           </a:p>
         </p:txBody>
       </p:sp>
@@ -2098,7 +2085,7 @@
           <a:p>
             <a:fld id="{2107A019-A245-4CF9-8404-4037D2D39BB4}" type="datetimeFigureOut">
               <a:rPr lang="de-DE" smtClean="0"/>
-              <a:t>07.12.2016</a:t>
+              <a:t>12.12.2016</a:t>
             </a:fld>
             <a:endParaRPr lang="de-DE"/>
           </a:p>
@@ -2204,7 +2191,6 @@
               <a:rPr lang="de-DE"/>
               <a:t>Titelmasterformat durch Klicken bearbeiten</a:t>
             </a:r>
-            <a:endParaRPr lang="de-DE"/>
           </a:p>
         </p:txBody>
       </p:sp>
@@ -2351,7 +2337,7 @@
           <a:p>
             <a:fld id="{2107A019-A245-4CF9-8404-4037D2D39BB4}" type="datetimeFigureOut">
               <a:rPr lang="de-DE" smtClean="0"/>
-              <a:t>07.12.2016</a:t>
+              <a:t>12.12.2016</a:t>
             </a:fld>
             <a:endParaRPr lang="de-DE"/>
           </a:p>
@@ -2463,7 +2449,6 @@
               <a:rPr lang="de-DE"/>
               <a:t>Titelmasterformat durch Klicken bearbeiten</a:t>
             </a:r>
-            <a:endParaRPr lang="de-DE"/>
           </a:p>
         </p:txBody>
       </p:sp>
@@ -2525,7 +2510,6 @@
               <a:rPr lang="de-DE"/>
               <a:t>Fünfte Ebene</a:t>
             </a:r>
-            <a:endParaRPr lang="de-DE"/>
           </a:p>
         </p:txBody>
       </p:sp>
@@ -2564,7 +2548,7 @@
           <a:p>
             <a:fld id="{2107A019-A245-4CF9-8404-4037D2D39BB4}" type="datetimeFigureOut">
               <a:rPr lang="de-DE" smtClean="0"/>
-              <a:t>07.12.2016</a:t>
+              <a:t>12.12.2016</a:t>
             </a:fld>
             <a:endParaRPr lang="de-DE"/>
           </a:p>
@@ -3062,7 +3046,6 @@
               <a:rPr lang="de-DE" dirty="0"/>
               <a:t> Movie Exploration Graph</a:t>
             </a:r>
-            <a:endParaRPr lang="de-DE" dirty="0"/>
           </a:p>
         </p:txBody>
       </p:sp>
@@ -3155,7 +3138,6 @@
               <a:rPr lang="de-DE" dirty="0"/>
               <a:t> Movie Exploration Graph</a:t>
             </a:r>
-            <a:endParaRPr lang="de-DE" dirty="0"/>
           </a:p>
         </p:txBody>
       </p:sp>
@@ -3652,6 +3634,29 @@
           <a:p>
             <a:endParaRPr lang="de-DE" dirty="0"/>
           </a:p>
+          <a:p>
+            <a:r>
+              <a:rPr lang="de-DE" dirty="0" err="1"/>
+              <a:t>Good</a:t>
+            </a:r>
+            <a:r>
+              <a:rPr lang="de-DE" dirty="0"/>
+              <a:t> </a:t>
+            </a:r>
+            <a:r>
+              <a:rPr lang="de-DE" dirty="0" err="1"/>
+              <a:t>movie</a:t>
+            </a:r>
+            <a:r>
+              <a:rPr lang="de-DE" dirty="0"/>
+              <a:t> </a:t>
+            </a:r>
+            <a:r>
+              <a:rPr lang="de-DE" dirty="0" err="1"/>
+              <a:t>recommendations</a:t>
+            </a:r>
+            <a:endParaRPr lang="de-DE" dirty="0"/>
+          </a:p>
         </p:txBody>
       </p:sp>
     </p:spTree>
@@ -3738,13 +3743,107 @@
           <a:p>
             <a:pPr lvl="1"/>
             <a:r>
-              <a:rPr lang="de-DE" dirty="0" err="1"/>
-              <a:t>Sparql</a:t>
+              <a:rPr lang="de-DE" dirty="0"/>
+              <a:t>Sparql.JS </a:t>
+            </a:r>
+            <a:r>
+              <a:rPr lang="de-DE" dirty="0" err="1"/>
+              <a:t>setup</a:t>
             </a:r>
             <a:endParaRPr lang="de-DE" dirty="0"/>
           </a:p>
           <a:p>
             <a:pPr lvl="1"/>
+            <a:r>
+              <a:rPr lang="de-DE" dirty="0"/>
+              <a:t>Entity </a:t>
+            </a:r>
+            <a:r>
+              <a:rPr lang="de-DE" dirty="0" err="1"/>
+              <a:t>queries</a:t>
+            </a:r>
+            <a:endParaRPr lang="de-DE" dirty="0"/>
+          </a:p>
+          <a:p>
+            <a:pPr lvl="1"/>
+            <a:r>
+              <a:rPr lang="de-DE" dirty="0"/>
+              <a:t>Movie </a:t>
+            </a:r>
+            <a:r>
+              <a:rPr lang="de-DE" dirty="0" err="1"/>
+              <a:t>recommendation</a:t>
+            </a:r>
+            <a:r>
+              <a:rPr lang="de-DE" dirty="0"/>
+              <a:t> </a:t>
+            </a:r>
+            <a:r>
+              <a:rPr lang="de-DE" dirty="0" err="1"/>
+              <a:t>algorithms</a:t>
+            </a:r>
+            <a:endParaRPr lang="de-DE" dirty="0"/>
+          </a:p>
+          <a:p>
+            <a:pPr lvl="1"/>
+            <a:endParaRPr lang="de-DE" dirty="0"/>
+          </a:p>
+          <a:p>
+            <a:r>
+              <a:rPr lang="de-DE" dirty="0"/>
+              <a:t>Mathias Möller</a:t>
+            </a:r>
+          </a:p>
+          <a:p>
+            <a:pPr lvl="1"/>
+            <a:r>
+              <a:rPr lang="de-DE" dirty="0"/>
+              <a:t>Graph </a:t>
+            </a:r>
+            <a:r>
+              <a:rPr lang="de-DE" dirty="0" err="1"/>
+              <a:t>visualization</a:t>
+            </a:r>
+            <a:endParaRPr lang="de-DE" dirty="0"/>
+          </a:p>
+          <a:p>
+            <a:pPr lvl="1"/>
+            <a:r>
+              <a:rPr lang="de-DE" dirty="0" err="1"/>
+              <a:t>Result</a:t>
+            </a:r>
+            <a:r>
+              <a:rPr lang="de-DE" dirty="0"/>
+              <a:t> </a:t>
+            </a:r>
+            <a:r>
+              <a:rPr lang="de-DE" dirty="0" err="1"/>
+              <a:t>parsing</a:t>
+            </a:r>
+            <a:endParaRPr lang="de-DE" dirty="0"/>
+          </a:p>
+          <a:p>
+            <a:pPr lvl="1"/>
+            <a:r>
+              <a:rPr lang="de-DE" dirty="0" err="1"/>
+              <a:t>Filtering</a:t>
+            </a:r>
+            <a:r>
+              <a:rPr lang="de-DE" dirty="0"/>
+              <a:t> </a:t>
+            </a:r>
+            <a:r>
+              <a:rPr lang="de-DE" dirty="0" err="1"/>
+              <a:t>important</a:t>
+            </a:r>
+            <a:r>
+              <a:rPr lang="de-DE" dirty="0"/>
+              <a:t> </a:t>
+            </a:r>
+            <a:r>
+              <a:rPr lang="de-DE" dirty="0" err="1"/>
+              <a:t>data</a:t>
+            </a:r>
             <a:endParaRPr lang="de-DE" dirty="0"/>
           </a:p>
         </p:txBody>

</xml_diff>

<commit_message>
Upload final pptx version
</commit_message>
<xml_diff>
--- a/Linked Movie Exploration Graph.pptx
+++ b/Linked Movie Exploration Graph.pptx
@@ -6,11 +6,12 @@
   </p:sldMasterIdLst>
   <p:sldIdLst>
     <p:sldId id="256" r:id="rId2"/>
-    <p:sldId id="257" r:id="rId3"/>
-    <p:sldId id="258" r:id="rId4"/>
-    <p:sldId id="259" r:id="rId5"/>
-    <p:sldId id="261" r:id="rId6"/>
-    <p:sldId id="260" r:id="rId7"/>
+    <p:sldId id="260" r:id="rId3"/>
+    <p:sldId id="257" r:id="rId4"/>
+    <p:sldId id="258" r:id="rId5"/>
+    <p:sldId id="259" r:id="rId6"/>
+    <p:sldId id="261" r:id="rId7"/>
+    <p:sldId id="262" r:id="rId8"/>
   </p:sldIdLst>
   <p:sldSz cx="12192000" cy="6858000"/>
   <p:notesSz cx="6858000" cy="9144000"/>
@@ -246,7 +247,7 @@
           <a:p>
             <a:fld id="{2107A019-A245-4CF9-8404-4037D2D39BB4}" type="datetimeFigureOut">
               <a:rPr lang="de-DE" smtClean="0"/>
-              <a:t>12.12.2016</a:t>
+              <a:t>13.12.2016</a:t>
             </a:fld>
             <a:endParaRPr lang="de-DE"/>
           </a:p>
@@ -414,7 +415,7 @@
           <a:p>
             <a:fld id="{2107A019-A245-4CF9-8404-4037D2D39BB4}" type="datetimeFigureOut">
               <a:rPr lang="de-DE" smtClean="0"/>
-              <a:t>12.12.2016</a:t>
+              <a:t>13.12.2016</a:t>
             </a:fld>
             <a:endParaRPr lang="de-DE"/>
           </a:p>
@@ -592,7 +593,7 @@
           <a:p>
             <a:fld id="{2107A019-A245-4CF9-8404-4037D2D39BB4}" type="datetimeFigureOut">
               <a:rPr lang="de-DE" smtClean="0"/>
-              <a:t>12.12.2016</a:t>
+              <a:t>13.12.2016</a:t>
             </a:fld>
             <a:endParaRPr lang="de-DE"/>
           </a:p>
@@ -760,7 +761,7 @@
           <a:p>
             <a:fld id="{2107A019-A245-4CF9-8404-4037D2D39BB4}" type="datetimeFigureOut">
               <a:rPr lang="de-DE" smtClean="0"/>
-              <a:t>12.12.2016</a:t>
+              <a:t>13.12.2016</a:t>
             </a:fld>
             <a:endParaRPr lang="de-DE"/>
           </a:p>
@@ -1005,7 +1006,7 @@
           <a:p>
             <a:fld id="{2107A019-A245-4CF9-8404-4037D2D39BB4}" type="datetimeFigureOut">
               <a:rPr lang="de-DE" smtClean="0"/>
-              <a:t>12.12.2016</a:t>
+              <a:t>13.12.2016</a:t>
             </a:fld>
             <a:endParaRPr lang="de-DE"/>
           </a:p>
@@ -1234,7 +1235,7 @@
           <a:p>
             <a:fld id="{2107A019-A245-4CF9-8404-4037D2D39BB4}" type="datetimeFigureOut">
               <a:rPr lang="de-DE" smtClean="0"/>
-              <a:t>12.12.2016</a:t>
+              <a:t>13.12.2016</a:t>
             </a:fld>
             <a:endParaRPr lang="de-DE"/>
           </a:p>
@@ -1598,7 +1599,7 @@
           <a:p>
             <a:fld id="{2107A019-A245-4CF9-8404-4037D2D39BB4}" type="datetimeFigureOut">
               <a:rPr lang="de-DE" smtClean="0"/>
-              <a:t>12.12.2016</a:t>
+              <a:t>13.12.2016</a:t>
             </a:fld>
             <a:endParaRPr lang="de-DE"/>
           </a:p>
@@ -1715,7 +1716,7 @@
           <a:p>
             <a:fld id="{2107A019-A245-4CF9-8404-4037D2D39BB4}" type="datetimeFigureOut">
               <a:rPr lang="de-DE" smtClean="0"/>
-              <a:t>12.12.2016</a:t>
+              <a:t>13.12.2016</a:t>
             </a:fld>
             <a:endParaRPr lang="de-DE"/>
           </a:p>
@@ -1810,7 +1811,7 @@
           <a:p>
             <a:fld id="{2107A019-A245-4CF9-8404-4037D2D39BB4}" type="datetimeFigureOut">
               <a:rPr lang="de-DE" smtClean="0"/>
-              <a:t>12.12.2016</a:t>
+              <a:t>13.12.2016</a:t>
             </a:fld>
             <a:endParaRPr lang="de-DE"/>
           </a:p>
@@ -2085,7 +2086,7 @@
           <a:p>
             <a:fld id="{2107A019-A245-4CF9-8404-4037D2D39BB4}" type="datetimeFigureOut">
               <a:rPr lang="de-DE" smtClean="0"/>
-              <a:t>12.12.2016</a:t>
+              <a:t>13.12.2016</a:t>
             </a:fld>
             <a:endParaRPr lang="de-DE"/>
           </a:p>
@@ -2337,7 +2338,7 @@
           <a:p>
             <a:fld id="{2107A019-A245-4CF9-8404-4037D2D39BB4}" type="datetimeFigureOut">
               <a:rPr lang="de-DE" smtClean="0"/>
-              <a:t>12.12.2016</a:t>
+              <a:t>13.12.2016</a:t>
             </a:fld>
             <a:endParaRPr lang="de-DE"/>
           </a:p>
@@ -2548,7 +2549,7 @@
           <a:p>
             <a:fld id="{2107A019-A245-4CF9-8404-4037D2D39BB4}" type="datetimeFigureOut">
               <a:rPr lang="de-DE" smtClean="0"/>
-              <a:t>12.12.2016</a:t>
+              <a:t>13.12.2016</a:t>
             </a:fld>
             <a:endParaRPr lang="de-DE"/>
           </a:p>
@@ -3072,15 +3073,7 @@
             </a:r>
             <a:r>
               <a:rPr lang="de-DE" dirty="0"/>
-              <a:t> </a:t>
-            </a:r>
-            <a:r>
-              <a:rPr lang="de-DE" sz="2450" dirty="0"/>
-              <a:t>Lorenzo Toso</a:t>
-            </a:r>
-            <a:r>
-              <a:rPr lang="de-DE" dirty="0"/>
-              <a:t> &amp; Mathias Möller</a:t>
+              <a:t> Lorenzo Toso &amp; Mathias Möller</a:t>
             </a:r>
           </a:p>
         </p:txBody>
@@ -3117,116 +3110,41 @@
       </p:grpSpPr>
       <p:sp>
         <p:nvSpPr>
-          <p:cNvPr id="2" name="Titel 1"/>
-          <p:cNvSpPr>
-            <a:spLocks noGrp="1"/>
-          </p:cNvSpPr>
-          <p:nvPr>
-            <p:ph type="title"/>
-          </p:nvPr>
-        </p:nvSpPr>
-        <p:spPr/>
-        <p:txBody>
-          <a:bodyPr/>
-          <a:lstStyle/>
-          <a:p>
-            <a:r>
-              <a:rPr lang="de-DE" dirty="0" err="1"/>
-              <a:t>Linked</a:t>
-            </a:r>
+          <p:cNvPr id="4" name="Titel 3"/>
+          <p:cNvSpPr>
+            <a:spLocks noGrp="1"/>
+          </p:cNvSpPr>
+          <p:nvPr>
+            <p:ph type="ctrTitle"/>
+          </p:nvPr>
+        </p:nvSpPr>
+        <p:spPr/>
+        <p:txBody>
+          <a:bodyPr/>
+          <a:lstStyle/>
+          <a:p>
             <a:r>
               <a:rPr lang="de-DE" dirty="0"/>
-              <a:t> Movie Exploration Graph</a:t>
-            </a:r>
-          </a:p>
-        </p:txBody>
-      </p:sp>
-      <p:sp>
-        <p:nvSpPr>
-          <p:cNvPr id="3" name="Inhaltsplatzhalter 2"/>
-          <p:cNvSpPr>
-            <a:spLocks noGrp="1"/>
-          </p:cNvSpPr>
-          <p:nvPr>
-            <p:ph idx="1"/>
-          </p:nvPr>
-        </p:nvSpPr>
-        <p:spPr/>
-        <p:txBody>
-          <a:bodyPr/>
-          <a:lstStyle/>
-          <a:p>
-            <a:r>
-              <a:rPr lang="de-DE" dirty="0"/>
-              <a:t>Language: JavaScript</a:t>
-            </a:r>
-          </a:p>
-          <a:p>
-            <a:r>
-              <a:rPr lang="de-DE" dirty="0"/>
-              <a:t>Frontend-Template: Materialdesign Light (</a:t>
-            </a:r>
-            <a:r>
-              <a:rPr lang="de-DE" dirty="0" err="1"/>
-              <a:t>Cutting</a:t>
-            </a:r>
-            <a:r>
-              <a:rPr lang="de-DE" dirty="0"/>
-              <a:t> Edge)</a:t>
-            </a:r>
-          </a:p>
-          <a:p>
-            <a:r>
-              <a:rPr lang="de-DE" dirty="0"/>
-              <a:t>Libraries: </a:t>
-            </a:r>
-          </a:p>
-          <a:p>
-            <a:pPr lvl="1"/>
-            <a:r>
-              <a:rPr lang="de-DE" dirty="0"/>
-              <a:t>Graph-Drawing: Vis.JS</a:t>
-            </a:r>
-          </a:p>
-          <a:p>
-            <a:pPr lvl="1"/>
-            <a:r>
-              <a:rPr lang="de-DE" dirty="0" err="1"/>
-              <a:t>Sparql</a:t>
-            </a:r>
-            <a:r>
-              <a:rPr lang="de-DE" dirty="0"/>
-              <a:t>: SPARQL.JS</a:t>
-            </a:r>
-          </a:p>
-          <a:p>
-            <a:r>
-              <a:rPr lang="de-DE" dirty="0" err="1"/>
-              <a:t>Sparql</a:t>
-            </a:r>
-            <a:r>
-              <a:rPr lang="de-DE" dirty="0"/>
-              <a:t>-Endpoints:</a:t>
-            </a:r>
-          </a:p>
-          <a:p>
-            <a:pPr lvl="1"/>
-            <a:r>
-              <a:rPr lang="de-DE" dirty="0" err="1"/>
-              <a:t>DBPedia</a:t>
-            </a:r>
-            <a:endParaRPr lang="de-DE" dirty="0"/>
-          </a:p>
-          <a:p>
-            <a:pPr lvl="1"/>
-            <a:r>
-              <a:rPr lang="de-DE" dirty="0" err="1"/>
-              <a:t>LinkedMDB</a:t>
-            </a:r>
-            <a:endParaRPr lang="de-DE" dirty="0"/>
-          </a:p>
-          <a:p>
-            <a:pPr lvl="1"/>
+              <a:t>Live Demo</a:t>
+            </a:r>
+          </a:p>
+        </p:txBody>
+      </p:sp>
+      <p:sp>
+        <p:nvSpPr>
+          <p:cNvPr id="5" name="Untertitel 4"/>
+          <p:cNvSpPr>
+            <a:spLocks noGrp="1"/>
+          </p:cNvSpPr>
+          <p:nvPr>
+            <p:ph type="subTitle" idx="1"/>
+          </p:nvPr>
+        </p:nvSpPr>
+        <p:spPr/>
+        <p:txBody>
+          <a:bodyPr/>
+          <a:lstStyle/>
+          <a:p>
             <a:endParaRPr lang="de-DE" dirty="0"/>
           </a:p>
         </p:txBody>
@@ -3234,7 +3152,7 @@
     </p:spTree>
     <p:extLst>
       <p:ext uri="{BB962C8B-B14F-4D97-AF65-F5344CB8AC3E}">
-        <p14:creationId xmlns:p14="http://schemas.microsoft.com/office/powerpoint/2010/main" val="1536855750"/>
+        <p14:creationId xmlns:p14="http://schemas.microsoft.com/office/powerpoint/2010/main" val="741498421"/>
       </p:ext>
     </p:extLst>
   </p:cSld>
@@ -3278,202 +3196,105 @@
           <a:p>
             <a:r>
               <a:rPr lang="de-DE" dirty="0" err="1"/>
-              <a:t>Functionality</a:t>
+              <a:t>Linked</a:t>
+            </a:r>
+            <a:r>
+              <a:rPr lang="de-DE" dirty="0"/>
+              <a:t> Movie Exploration Graph</a:t>
+            </a:r>
+          </a:p>
+        </p:txBody>
+      </p:sp>
+      <p:sp>
+        <p:nvSpPr>
+          <p:cNvPr id="3" name="Inhaltsplatzhalter 2"/>
+          <p:cNvSpPr>
+            <a:spLocks noGrp="1"/>
+          </p:cNvSpPr>
+          <p:nvPr>
+            <p:ph idx="1"/>
+          </p:nvPr>
+        </p:nvSpPr>
+        <p:spPr/>
+        <p:txBody>
+          <a:bodyPr/>
+          <a:lstStyle/>
+          <a:p>
+            <a:r>
+              <a:rPr lang="de-DE" dirty="0"/>
+              <a:t>Language: JavaScript</a:t>
+            </a:r>
+          </a:p>
+          <a:p>
+            <a:r>
+              <a:rPr lang="de-DE" dirty="0"/>
+              <a:t>Libraries: </a:t>
+            </a:r>
+          </a:p>
+          <a:p>
+            <a:pPr lvl="1"/>
+            <a:r>
+              <a:rPr lang="de-DE" dirty="0"/>
+              <a:t>Graph-Drawing: Vis.JS (</a:t>
+            </a:r>
+            <a:r>
+              <a:rPr lang="en-GB" dirty="0"/>
+              <a:t>temporarily</a:t>
+            </a:r>
+            <a:r>
+              <a:rPr lang="de-DE" dirty="0"/>
+              <a:t>)</a:t>
+            </a:r>
+          </a:p>
+          <a:p>
+            <a:pPr lvl="1"/>
+            <a:r>
+              <a:rPr lang="de-DE" dirty="0" err="1"/>
+              <a:t>Sparql</a:t>
+            </a:r>
+            <a:r>
+              <a:rPr lang="de-DE" dirty="0"/>
+              <a:t>: SPARQL.JS</a:t>
+            </a:r>
+          </a:p>
+          <a:p>
+            <a:r>
+              <a:rPr lang="de-DE" dirty="0" err="1"/>
+              <a:t>Sparql</a:t>
+            </a:r>
+            <a:r>
+              <a:rPr lang="de-DE" dirty="0"/>
+              <a:t>-Endpoints:	</a:t>
+            </a:r>
+          </a:p>
+          <a:p>
+            <a:pPr lvl="1"/>
+            <a:r>
+              <a:rPr lang="de-DE" dirty="0" err="1"/>
+              <a:t>DBPedia</a:t>
             </a:r>
             <a:endParaRPr lang="de-DE" dirty="0"/>
           </a:p>
-        </p:txBody>
-      </p:sp>
-      <p:sp>
-        <p:nvSpPr>
-          <p:cNvPr id="3" name="Inhaltsplatzhalter 2"/>
-          <p:cNvSpPr>
-            <a:spLocks noGrp="1"/>
-          </p:cNvSpPr>
-          <p:nvPr>
-            <p:ph idx="1"/>
-          </p:nvPr>
-        </p:nvSpPr>
-        <p:spPr/>
-        <p:txBody>
-          <a:bodyPr/>
-          <a:lstStyle/>
+          <a:p>
+            <a:pPr lvl="1"/>
+            <a:r>
+              <a:rPr lang="de-DE" dirty="0" err="1"/>
+              <a:t>LinkedMDB</a:t>
+            </a:r>
+            <a:endParaRPr lang="de-DE" dirty="0"/>
+          </a:p>
           <a:p>
             <a:r>
               <a:rPr lang="de-DE" dirty="0"/>
-              <a:t>Create </a:t>
-            </a:r>
-            <a:r>
-              <a:rPr lang="de-DE" dirty="0" err="1"/>
-              <a:t>graph</a:t>
-            </a:r>
-            <a:r>
-              <a:rPr lang="de-DE" dirty="0"/>
-              <a:t> </a:t>
-            </a:r>
-            <a:r>
-              <a:rPr lang="de-DE" dirty="0" err="1"/>
-              <a:t>based</a:t>
-            </a:r>
-            <a:r>
-              <a:rPr lang="de-DE" dirty="0"/>
-              <a:t> on </a:t>
-            </a:r>
-            <a:r>
-              <a:rPr lang="de-DE" dirty="0" err="1"/>
-              <a:t>search</a:t>
-            </a:r>
-            <a:r>
-              <a:rPr lang="de-DE" dirty="0"/>
-              <a:t> </a:t>
-            </a:r>
-            <a:r>
-              <a:rPr lang="de-DE" dirty="0" err="1"/>
-              <a:t>term</a:t>
-            </a:r>
-            <a:endParaRPr lang="de-DE" dirty="0"/>
-          </a:p>
-          <a:p>
-            <a:pPr lvl="1"/>
-            <a:r>
-              <a:rPr lang="de-DE" dirty="0" err="1"/>
-              <a:t>Explore</a:t>
-            </a:r>
-            <a:r>
-              <a:rPr lang="de-DE" dirty="0"/>
-              <a:t> Movies, </a:t>
-            </a:r>
-            <a:r>
-              <a:rPr lang="de-DE" dirty="0" err="1"/>
-              <a:t>Actors</a:t>
-            </a:r>
-            <a:r>
-              <a:rPr lang="de-DE" dirty="0"/>
-              <a:t>, Producers, Awards </a:t>
-            </a:r>
-            <a:r>
-              <a:rPr lang="de-DE" dirty="0" err="1"/>
-              <a:t>etc</a:t>
-            </a:r>
-            <a:r>
-              <a:rPr lang="de-DE" dirty="0"/>
-              <a:t>! </a:t>
-            </a:r>
-          </a:p>
-          <a:p>
-            <a:pPr lvl="1"/>
-            <a:endParaRPr lang="de-DE" dirty="0"/>
-          </a:p>
-          <a:p>
-            <a:r>
-              <a:rPr lang="de-DE" dirty="0" err="1"/>
-              <a:t>Allow</a:t>
-            </a:r>
-            <a:r>
-              <a:rPr lang="de-DE" dirty="0"/>
-              <a:t> </a:t>
-            </a:r>
-            <a:r>
-              <a:rPr lang="de-DE" dirty="0" err="1"/>
-              <a:t>further</a:t>
-            </a:r>
-            <a:r>
-              <a:rPr lang="de-DE" dirty="0"/>
-              <a:t> </a:t>
-            </a:r>
-            <a:r>
-              <a:rPr lang="de-DE" dirty="0" err="1"/>
-              <a:t>exploration</a:t>
-            </a:r>
-            <a:r>
-              <a:rPr lang="de-DE" dirty="0"/>
-              <a:t> </a:t>
-            </a:r>
-            <a:r>
-              <a:rPr lang="de-DE" dirty="0" err="1"/>
-              <a:t>by</a:t>
-            </a:r>
-            <a:r>
-              <a:rPr lang="de-DE" dirty="0"/>
-              <a:t> </a:t>
-            </a:r>
-            <a:r>
-              <a:rPr lang="de-DE" dirty="0" err="1"/>
-              <a:t>clicking</a:t>
-            </a:r>
-            <a:r>
-              <a:rPr lang="de-DE" dirty="0"/>
-              <a:t> </a:t>
-            </a:r>
-            <a:r>
-              <a:rPr lang="de-DE" dirty="0" err="1"/>
-              <a:t>nodes</a:t>
-            </a:r>
-            <a:endParaRPr lang="de-DE" dirty="0"/>
-          </a:p>
-          <a:p>
-            <a:pPr lvl="1"/>
-            <a:r>
-              <a:rPr lang="de-DE" dirty="0" err="1"/>
-              <a:t>Expands</a:t>
-            </a:r>
-            <a:r>
-              <a:rPr lang="de-DE" dirty="0"/>
-              <a:t> </a:t>
-            </a:r>
-            <a:r>
-              <a:rPr lang="de-DE" dirty="0" err="1"/>
-              <a:t>the</a:t>
-            </a:r>
-            <a:r>
-              <a:rPr lang="de-DE" dirty="0"/>
-              <a:t> </a:t>
-            </a:r>
-            <a:r>
-              <a:rPr lang="de-DE" dirty="0" err="1"/>
-              <a:t>graph</a:t>
-            </a:r>
-            <a:endParaRPr lang="de-DE" dirty="0"/>
-          </a:p>
-          <a:p>
-            <a:pPr lvl="1"/>
-            <a:endParaRPr lang="de-DE" dirty="0"/>
-          </a:p>
-          <a:p>
-            <a:r>
-              <a:rPr lang="de-DE" dirty="0" err="1"/>
-              <a:t>Explore</a:t>
-            </a:r>
-            <a:r>
-              <a:rPr lang="de-DE" dirty="0"/>
-              <a:t> </a:t>
-            </a:r>
-            <a:r>
-              <a:rPr lang="de-DE" dirty="0" err="1"/>
-              <a:t>movie</a:t>
-            </a:r>
-            <a:r>
-              <a:rPr lang="de-DE" dirty="0"/>
-              <a:t> </a:t>
-            </a:r>
-            <a:r>
-              <a:rPr lang="de-DE" dirty="0" err="1"/>
-              <a:t>recommendations</a:t>
-            </a:r>
-            <a:endParaRPr lang="de-DE" dirty="0"/>
-          </a:p>
-          <a:p>
-            <a:endParaRPr lang="de-DE" dirty="0"/>
-          </a:p>
-          <a:p>
-            <a:endParaRPr lang="de-DE" dirty="0"/>
+              <a:t>Frontend-Template: Materialdesign Light</a:t>
+            </a:r>
           </a:p>
         </p:txBody>
       </p:sp>
     </p:spTree>
     <p:extLst>
       <p:ext uri="{BB962C8B-B14F-4D97-AF65-F5344CB8AC3E}">
-        <p14:creationId xmlns:p14="http://schemas.microsoft.com/office/powerpoint/2010/main" val="1815357314"/>
+        <p14:creationId xmlns:p14="http://schemas.microsoft.com/office/powerpoint/2010/main" val="1536855750"/>
       </p:ext>
     </p:extLst>
   </p:cSld>
@@ -3517,7 +3338,7 @@
           <a:p>
             <a:r>
               <a:rPr lang="de-DE" dirty="0" err="1"/>
-              <a:t>Challanges</a:t>
+              <a:t>Functionality</a:t>
             </a:r>
             <a:endParaRPr lang="de-DE" dirty="0"/>
           </a:p>
@@ -3539,130 +3360,63 @@
           <a:lstStyle/>
           <a:p>
             <a:r>
-              <a:rPr lang="de-DE" dirty="0"/>
-              <a:t>Performance </a:t>
-            </a:r>
-            <a:r>
-              <a:rPr lang="de-DE" dirty="0" err="1"/>
-              <a:t>of</a:t>
-            </a:r>
-            <a:r>
-              <a:rPr lang="de-DE" dirty="0"/>
-              <a:t> </a:t>
-            </a:r>
-            <a:r>
-              <a:rPr lang="de-DE" dirty="0" err="1"/>
-              <a:t>graph</a:t>
-            </a:r>
-            <a:r>
-              <a:rPr lang="de-DE" dirty="0"/>
-              <a:t> </a:t>
-            </a:r>
-            <a:r>
-              <a:rPr lang="de-DE" dirty="0" err="1"/>
-              <a:t>drawing</a:t>
-            </a:r>
-            <a:endParaRPr lang="de-DE" dirty="0"/>
-          </a:p>
-          <a:p>
-            <a:endParaRPr lang="de-DE" dirty="0"/>
-          </a:p>
-          <a:p>
-            <a:r>
-              <a:rPr lang="de-DE" dirty="0" err="1"/>
-              <a:t>Merge</a:t>
-            </a:r>
-            <a:r>
-              <a:rPr lang="de-DE" dirty="0"/>
-              <a:t> </a:t>
-            </a:r>
-            <a:r>
-              <a:rPr lang="de-DE" dirty="0" err="1"/>
-              <a:t>already</a:t>
-            </a:r>
-            <a:r>
-              <a:rPr lang="de-DE" dirty="0"/>
-              <a:t> </a:t>
-            </a:r>
-            <a:r>
-              <a:rPr lang="de-DE" dirty="0" err="1"/>
-              <a:t>existing</a:t>
-            </a:r>
-            <a:r>
-              <a:rPr lang="de-DE" dirty="0"/>
-              <a:t> </a:t>
-            </a:r>
-            <a:r>
-              <a:rPr lang="de-DE" dirty="0" err="1"/>
-              <a:t>nodes</a:t>
-            </a:r>
-            <a:endParaRPr lang="de-DE" dirty="0"/>
-          </a:p>
-          <a:p>
-            <a:endParaRPr lang="de-DE" dirty="0"/>
-          </a:p>
-          <a:p>
-            <a:r>
-              <a:rPr lang="de-DE" dirty="0"/>
-              <a:t>CORS-</a:t>
-            </a:r>
-            <a:r>
-              <a:rPr lang="de-DE" dirty="0" err="1"/>
-              <a:t>Requests</a:t>
-            </a:r>
-            <a:r>
-              <a:rPr lang="de-DE" dirty="0"/>
-              <a:t> </a:t>
-            </a:r>
-            <a:r>
-              <a:rPr lang="de-DE" dirty="0" err="1"/>
-              <a:t>are</a:t>
-            </a:r>
-            <a:r>
-              <a:rPr lang="de-DE" dirty="0"/>
-              <a:t> </a:t>
-            </a:r>
-            <a:r>
-              <a:rPr lang="de-DE" dirty="0" err="1"/>
-              <a:t>forbidden</a:t>
-            </a:r>
-            <a:r>
-              <a:rPr lang="de-DE" dirty="0"/>
-              <a:t> in JavaScript</a:t>
-            </a:r>
-          </a:p>
-          <a:p>
-            <a:endParaRPr lang="de-DE" dirty="0"/>
-          </a:p>
-          <a:p>
-            <a:r>
-              <a:rPr lang="de-DE" dirty="0" err="1"/>
-              <a:t>Good</a:t>
-            </a:r>
-            <a:r>
-              <a:rPr lang="de-DE" dirty="0"/>
-              <a:t> </a:t>
-            </a:r>
-            <a:r>
-              <a:rPr lang="de-DE" dirty="0" err="1"/>
-              <a:t>movie</a:t>
-            </a:r>
-            <a:r>
-              <a:rPr lang="de-DE" dirty="0"/>
-              <a:t> </a:t>
-            </a:r>
-            <a:r>
-              <a:rPr lang="de-DE" dirty="0" err="1"/>
-              <a:t>recommendations</a:t>
-            </a:r>
-            <a:endParaRPr lang="de-DE" dirty="0"/>
+              <a:rPr lang="en-GB" dirty="0"/>
+              <a:t>Create graph based on search term</a:t>
+            </a:r>
+          </a:p>
+          <a:p>
+            <a:pPr lvl="1"/>
+            <a:r>
+              <a:rPr lang="en-GB" dirty="0"/>
+              <a:t>Explore Movies, Actors, Producers, Awards, etc. </a:t>
+            </a:r>
+          </a:p>
+          <a:p>
+            <a:pPr lvl="1"/>
+            <a:endParaRPr lang="en-GB" dirty="0"/>
+          </a:p>
+          <a:p>
+            <a:r>
+              <a:rPr lang="en-GB" dirty="0"/>
+              <a:t>Allow further exploration by clicking nodes</a:t>
+            </a:r>
+          </a:p>
+          <a:p>
+            <a:pPr lvl="1"/>
+            <a:r>
+              <a:rPr lang="en-GB" dirty="0"/>
+              <a:t>Loads further data from SPARQL endpoint</a:t>
+            </a:r>
+          </a:p>
+          <a:p>
+            <a:pPr lvl="1"/>
+            <a:r>
+              <a:rPr lang="en-GB" dirty="0"/>
+              <a:t>Expands the graph</a:t>
+            </a:r>
+          </a:p>
+          <a:p>
+            <a:pPr lvl="1"/>
+            <a:endParaRPr lang="en-GB" dirty="0"/>
+          </a:p>
+          <a:p>
+            <a:r>
+              <a:rPr lang="en-GB" dirty="0"/>
+              <a:t>Explore movie recommendations</a:t>
+            </a:r>
+          </a:p>
+          <a:p>
+            <a:endParaRPr lang="en-GB" dirty="0"/>
+          </a:p>
+          <a:p>
+            <a:endParaRPr lang="en-GB" dirty="0"/>
           </a:p>
         </p:txBody>
       </p:sp>
     </p:spTree>
     <p:extLst>
       <p:ext uri="{BB962C8B-B14F-4D97-AF65-F5344CB8AC3E}">
-        <p14:creationId xmlns:p14="http://schemas.microsoft.com/office/powerpoint/2010/main" val="3389106340"/>
+        <p14:creationId xmlns:p14="http://schemas.microsoft.com/office/powerpoint/2010/main" val="1815357314"/>
       </p:ext>
     </p:extLst>
   </p:cSld>
@@ -3705,8 +3459,75 @@
           <a:lstStyle/>
           <a:p>
             <a:r>
+              <a:rPr lang="en-GB" dirty="0"/>
+              <a:t>Challenges</a:t>
+            </a:r>
+          </a:p>
+        </p:txBody>
+      </p:sp>
+      <p:sp>
+        <p:nvSpPr>
+          <p:cNvPr id="3" name="Inhaltsplatzhalter 2"/>
+          <p:cNvSpPr>
+            <a:spLocks noGrp="1"/>
+          </p:cNvSpPr>
+          <p:nvPr>
+            <p:ph idx="1"/>
+          </p:nvPr>
+        </p:nvSpPr>
+        <p:spPr/>
+        <p:txBody>
+          <a:bodyPr>
+            <a:normAutofit fontScale="92500" lnSpcReduction="20000"/>
+          </a:bodyPr>
+          <a:lstStyle/>
+          <a:p>
+            <a:r>
+              <a:rPr lang="en-GB" dirty="0"/>
+              <a:t>Performance of graph drawing </a:t>
+            </a:r>
+          </a:p>
+          <a:p>
+            <a:pPr lvl="1"/>
+            <a:r>
+              <a:rPr lang="en-GB" dirty="0"/>
+              <a:t>Images are expensive to display</a:t>
+            </a:r>
+          </a:p>
+          <a:p>
+            <a:pPr lvl="1"/>
+            <a:r>
+              <a:rPr lang="en-GB" dirty="0"/>
+              <a:t>Need to be redrawn every time a node moves</a:t>
+            </a:r>
+          </a:p>
+          <a:p>
+            <a:endParaRPr lang="en-GB" dirty="0"/>
+          </a:p>
+          <a:p>
+            <a:r>
+              <a:rPr lang="en-GB" dirty="0"/>
+              <a:t>Merge already existing nodes</a:t>
+            </a:r>
+          </a:p>
+          <a:p>
+            <a:pPr lvl="1"/>
+            <a:r>
+              <a:rPr lang="en-GB" dirty="0"/>
+              <a:t>Cycles are better than duplicated nodes</a:t>
+            </a:r>
+          </a:p>
+          <a:p>
+            <a:endParaRPr lang="en-GB" dirty="0"/>
+          </a:p>
+          <a:p>
+            <a:r>
+              <a:rPr lang="de-DE" dirty="0"/>
+              <a:t>CORS-</a:t>
+            </a:r>
+            <a:r>
               <a:rPr lang="de-DE" dirty="0" err="1"/>
-              <a:t>Workload</a:t>
+              <a:t>Requests</a:t>
             </a:r>
             <a:r>
               <a:rPr lang="de-DE" dirty="0"/>
@@ -3714,65 +3535,7 @@
             </a:r>
             <a:r>
               <a:rPr lang="de-DE" dirty="0" err="1"/>
-              <a:t>separation</a:t>
-            </a:r>
-            <a:endParaRPr lang="de-DE" dirty="0"/>
-          </a:p>
-        </p:txBody>
-      </p:sp>
-      <p:sp>
-        <p:nvSpPr>
-          <p:cNvPr id="3" name="Inhaltsplatzhalter 2"/>
-          <p:cNvSpPr>
-            <a:spLocks noGrp="1"/>
-          </p:cNvSpPr>
-          <p:nvPr>
-            <p:ph idx="1"/>
-          </p:nvPr>
-        </p:nvSpPr>
-        <p:spPr/>
-        <p:txBody>
-          <a:bodyPr/>
-          <a:lstStyle/>
-          <a:p>
-            <a:r>
-              <a:rPr lang="de-DE" dirty="0"/>
-              <a:t>Lorenzo Toso</a:t>
-            </a:r>
-          </a:p>
-          <a:p>
-            <a:pPr lvl="1"/>
-            <a:r>
-              <a:rPr lang="de-DE" dirty="0"/>
-              <a:t>Sparql.JS </a:t>
-            </a:r>
-            <a:r>
-              <a:rPr lang="de-DE" dirty="0" err="1"/>
-              <a:t>setup</a:t>
-            </a:r>
-            <a:endParaRPr lang="de-DE" dirty="0"/>
-          </a:p>
-          <a:p>
-            <a:pPr lvl="1"/>
-            <a:r>
-              <a:rPr lang="de-DE" dirty="0"/>
-              <a:t>Entity </a:t>
-            </a:r>
-            <a:r>
-              <a:rPr lang="de-DE" dirty="0" err="1"/>
-              <a:t>queries</a:t>
-            </a:r>
-            <a:endParaRPr lang="de-DE" dirty="0"/>
-          </a:p>
-          <a:p>
-            <a:pPr lvl="1"/>
-            <a:r>
-              <a:rPr lang="de-DE" dirty="0"/>
-              <a:t>Movie </a:t>
-            </a:r>
-            <a:r>
-              <a:rPr lang="de-DE" dirty="0" err="1"/>
-              <a:t>recommendation</a:t>
+              <a:t>are</a:t>
             </a:r>
             <a:r>
               <a:rPr lang="de-DE" dirty="0"/>
@@ -3780,78 +3543,35 @@
             </a:r>
             <a:r>
               <a:rPr lang="de-DE" dirty="0" err="1"/>
-              <a:t>algorithms</a:t>
-            </a:r>
+              <a:t>forbidden</a:t>
+            </a:r>
+            <a:r>
+              <a:rPr lang="de-DE" dirty="0"/>
+              <a:t> in JavaScript</a:t>
+            </a:r>
+          </a:p>
+          <a:p>
             <a:endParaRPr lang="de-DE" dirty="0"/>
           </a:p>
           <a:p>
+            <a:r>
+              <a:rPr lang="en-GB" dirty="0"/>
+              <a:t>Good movie recommendations </a:t>
+            </a:r>
+          </a:p>
+          <a:p>
             <a:pPr lvl="1"/>
-            <a:endParaRPr lang="de-DE" dirty="0"/>
-          </a:p>
-          <a:p>
-            <a:r>
-              <a:rPr lang="de-DE" dirty="0"/>
-              <a:t>Mathias Möller</a:t>
-            </a:r>
-          </a:p>
-          <a:p>
-            <a:pPr lvl="1"/>
-            <a:r>
-              <a:rPr lang="de-DE" dirty="0"/>
-              <a:t>Graph </a:t>
-            </a:r>
-            <a:r>
-              <a:rPr lang="de-DE" dirty="0" err="1"/>
-              <a:t>visualization</a:t>
-            </a:r>
-            <a:endParaRPr lang="de-DE" dirty="0"/>
-          </a:p>
-          <a:p>
-            <a:pPr lvl="1"/>
-            <a:r>
-              <a:rPr lang="de-DE" dirty="0" err="1"/>
-              <a:t>Result</a:t>
-            </a:r>
-            <a:r>
-              <a:rPr lang="de-DE" dirty="0"/>
-              <a:t> </a:t>
-            </a:r>
-            <a:r>
-              <a:rPr lang="de-DE" dirty="0" err="1"/>
-              <a:t>parsing</a:t>
-            </a:r>
-            <a:endParaRPr lang="de-DE" dirty="0"/>
-          </a:p>
-          <a:p>
-            <a:pPr lvl="1"/>
-            <a:r>
-              <a:rPr lang="de-DE" dirty="0" err="1"/>
-              <a:t>Filtering</a:t>
-            </a:r>
-            <a:r>
-              <a:rPr lang="de-DE" dirty="0"/>
-              <a:t> </a:t>
-            </a:r>
-            <a:r>
-              <a:rPr lang="de-DE" dirty="0" err="1"/>
-              <a:t>important</a:t>
-            </a:r>
-            <a:r>
-              <a:rPr lang="de-DE" dirty="0"/>
-              <a:t> </a:t>
-            </a:r>
-            <a:r>
-              <a:rPr lang="de-DE" dirty="0" err="1"/>
-              <a:t>data</a:t>
-            </a:r>
-            <a:endParaRPr lang="de-DE" dirty="0"/>
+            <a:r>
+              <a:rPr lang="en-GB" dirty="0"/>
+              <a:t>Serendipitous discovery</a:t>
+            </a:r>
           </a:p>
         </p:txBody>
       </p:sp>
     </p:spTree>
     <p:extLst>
       <p:ext uri="{BB962C8B-B14F-4D97-AF65-F5344CB8AC3E}">
-        <p14:creationId xmlns:p14="http://schemas.microsoft.com/office/powerpoint/2010/main" val="3234659082"/>
+        <p14:creationId xmlns:p14="http://schemas.microsoft.com/office/powerpoint/2010/main" val="3389106340"/>
       </p:ext>
     </p:extLst>
   </p:cSld>
@@ -3880,49 +3600,247 @@
       </p:grpSpPr>
       <p:sp>
         <p:nvSpPr>
-          <p:cNvPr id="4" name="Titel 3"/>
-          <p:cNvSpPr>
-            <a:spLocks noGrp="1"/>
-          </p:cNvSpPr>
-          <p:nvPr>
-            <p:ph type="ctrTitle"/>
-          </p:nvPr>
-        </p:nvSpPr>
-        <p:spPr/>
-        <p:txBody>
-          <a:bodyPr/>
-          <a:lstStyle/>
-          <a:p>
+          <p:cNvPr id="2" name="Titel 1"/>
+          <p:cNvSpPr>
+            <a:spLocks noGrp="1"/>
+          </p:cNvSpPr>
+          <p:nvPr>
+            <p:ph type="title"/>
+          </p:nvPr>
+        </p:nvSpPr>
+        <p:spPr/>
+        <p:txBody>
+          <a:bodyPr/>
+          <a:lstStyle/>
+          <a:p>
+            <a:r>
+              <a:rPr lang="de-DE" dirty="0" err="1"/>
+              <a:t>Workload</a:t>
+            </a:r>
             <a:r>
               <a:rPr lang="de-DE" dirty="0"/>
-              <a:t>Live Demo</a:t>
-            </a:r>
-          </a:p>
-        </p:txBody>
-      </p:sp>
-      <p:sp>
-        <p:nvSpPr>
-          <p:cNvPr id="5" name="Untertitel 4"/>
-          <p:cNvSpPr>
-            <a:spLocks noGrp="1"/>
-          </p:cNvSpPr>
-          <p:nvPr>
-            <p:ph type="subTitle" idx="1"/>
-          </p:nvPr>
-        </p:nvSpPr>
-        <p:spPr/>
-        <p:txBody>
-          <a:bodyPr/>
-          <a:lstStyle/>
-          <a:p>
-            <a:endParaRPr lang="de-DE"/>
+              <a:t> </a:t>
+            </a:r>
+            <a:r>
+              <a:rPr lang="de-DE" dirty="0" err="1"/>
+              <a:t>separation</a:t>
+            </a:r>
+            <a:endParaRPr lang="de-DE" dirty="0"/>
+          </a:p>
+        </p:txBody>
+      </p:sp>
+      <p:sp>
+        <p:nvSpPr>
+          <p:cNvPr id="3" name="Inhaltsplatzhalter 2"/>
+          <p:cNvSpPr>
+            <a:spLocks noGrp="1"/>
+          </p:cNvSpPr>
+          <p:nvPr>
+            <p:ph idx="1"/>
+          </p:nvPr>
+        </p:nvSpPr>
+        <p:spPr/>
+        <p:txBody>
+          <a:bodyPr/>
+          <a:lstStyle/>
+          <a:p>
+            <a:r>
+              <a:rPr lang="de-DE" dirty="0"/>
+              <a:t>Lorenzo </a:t>
+            </a:r>
+            <a:r>
+              <a:rPr lang="de-DE" dirty="0" err="1"/>
+              <a:t>Toso</a:t>
+            </a:r>
+            <a:endParaRPr lang="de-DE" dirty="0"/>
+          </a:p>
+          <a:p>
+            <a:pPr lvl="1"/>
+            <a:r>
+              <a:rPr lang="de-DE" dirty="0"/>
+              <a:t>Sparql.JS </a:t>
+            </a:r>
+            <a:r>
+              <a:rPr lang="de-DE" dirty="0" err="1"/>
+              <a:t>setup</a:t>
+            </a:r>
+            <a:endParaRPr lang="de-DE" dirty="0"/>
+          </a:p>
+          <a:p>
+            <a:pPr lvl="1"/>
+            <a:r>
+              <a:rPr lang="de-DE" dirty="0"/>
+              <a:t>Entity </a:t>
+            </a:r>
+            <a:r>
+              <a:rPr lang="de-DE" dirty="0" err="1"/>
+              <a:t>queries</a:t>
+            </a:r>
+            <a:endParaRPr lang="de-DE" dirty="0"/>
+          </a:p>
+          <a:p>
+            <a:pPr lvl="1"/>
+            <a:r>
+              <a:rPr lang="de-DE" dirty="0"/>
+              <a:t>Movie </a:t>
+            </a:r>
+            <a:r>
+              <a:rPr lang="de-DE" dirty="0" err="1"/>
+              <a:t>recommendation</a:t>
+            </a:r>
+            <a:r>
+              <a:rPr lang="de-DE" dirty="0"/>
+              <a:t> </a:t>
+            </a:r>
+            <a:r>
+              <a:rPr lang="de-DE" dirty="0" err="1"/>
+              <a:t>algorithms</a:t>
+            </a:r>
+            <a:endParaRPr lang="de-DE" dirty="0"/>
+          </a:p>
+          <a:p>
+            <a:pPr lvl="1"/>
+            <a:endParaRPr lang="de-DE" dirty="0"/>
+          </a:p>
+          <a:p>
+            <a:r>
+              <a:rPr lang="de-DE" dirty="0"/>
+              <a:t>Mathias Möller</a:t>
+            </a:r>
+          </a:p>
+          <a:p>
+            <a:pPr lvl="1"/>
+            <a:r>
+              <a:rPr lang="de-DE" dirty="0"/>
+              <a:t>Graph </a:t>
+            </a:r>
+            <a:r>
+              <a:rPr lang="de-DE" dirty="0" err="1"/>
+              <a:t>visualization</a:t>
+            </a:r>
+            <a:endParaRPr lang="de-DE" dirty="0"/>
+          </a:p>
+          <a:p>
+            <a:pPr lvl="1"/>
+            <a:r>
+              <a:rPr lang="de-DE" dirty="0" err="1"/>
+              <a:t>Result</a:t>
+            </a:r>
+            <a:r>
+              <a:rPr lang="de-DE" dirty="0"/>
+              <a:t> </a:t>
+            </a:r>
+            <a:r>
+              <a:rPr lang="de-DE" dirty="0" err="1"/>
+              <a:t>parsing</a:t>
+            </a:r>
+            <a:endParaRPr lang="de-DE" dirty="0"/>
+          </a:p>
+          <a:p>
+            <a:pPr lvl="1"/>
+            <a:r>
+              <a:rPr lang="de-DE" dirty="0" err="1"/>
+              <a:t>Filtering</a:t>
+            </a:r>
+            <a:r>
+              <a:rPr lang="de-DE" dirty="0"/>
+              <a:t> </a:t>
+            </a:r>
+            <a:r>
+              <a:rPr lang="de-DE" dirty="0" err="1"/>
+              <a:t>important</a:t>
+            </a:r>
+            <a:r>
+              <a:rPr lang="de-DE" dirty="0"/>
+              <a:t> </a:t>
+            </a:r>
+            <a:r>
+              <a:rPr lang="de-DE" dirty="0" err="1"/>
+              <a:t>data</a:t>
+            </a:r>
+            <a:endParaRPr lang="de-DE" dirty="0"/>
           </a:p>
         </p:txBody>
       </p:sp>
     </p:spTree>
     <p:extLst>
       <p:ext uri="{BB962C8B-B14F-4D97-AF65-F5344CB8AC3E}">
-        <p14:creationId xmlns:p14="http://schemas.microsoft.com/office/powerpoint/2010/main" val="741498421"/>
+        <p14:creationId xmlns:p14="http://schemas.microsoft.com/office/powerpoint/2010/main" val="3234659082"/>
+      </p:ext>
+    </p:extLst>
+  </p:cSld>
+  <p:clrMapOvr>
+    <a:masterClrMapping/>
+  </p:clrMapOvr>
+</p:sld>
+</file>
+
+<file path=ppt/slides/slide7.xml><?xml version="1.0" encoding="utf-8"?>
+<p:sld xmlns:a="http://schemas.openxmlformats.org/drawingml/2006/main" xmlns:r="http://schemas.openxmlformats.org/officeDocument/2006/relationships" xmlns:p="http://schemas.openxmlformats.org/presentationml/2006/main">
+  <p:cSld>
+    <p:spTree>
+      <p:nvGrpSpPr>
+        <p:cNvPr id="1" name=""/>
+        <p:cNvGrpSpPr/>
+        <p:nvPr/>
+      </p:nvGrpSpPr>
+      <p:grpSpPr>
+        <a:xfrm>
+          <a:off x="0" y="0"/>
+          <a:ext cx="0" cy="0"/>
+          <a:chOff x="0" y="0"/>
+          <a:chExt cx="0" cy="0"/>
+        </a:xfrm>
+      </p:grpSpPr>
+      <p:sp>
+        <p:nvSpPr>
+          <p:cNvPr id="4" name="Titel 3"/>
+          <p:cNvSpPr>
+            <a:spLocks noGrp="1"/>
+          </p:cNvSpPr>
+          <p:nvPr>
+            <p:ph type="ctrTitle"/>
+          </p:nvPr>
+        </p:nvSpPr>
+        <p:spPr/>
+        <p:txBody>
+          <a:bodyPr/>
+          <a:lstStyle/>
+          <a:p>
+            <a:r>
+              <a:rPr lang="de-DE" dirty="0" err="1"/>
+              <a:t>Questions</a:t>
+            </a:r>
+            <a:r>
+              <a:rPr lang="de-DE" dirty="0"/>
+              <a:t>?</a:t>
+            </a:r>
+          </a:p>
+        </p:txBody>
+      </p:sp>
+      <p:sp>
+        <p:nvSpPr>
+          <p:cNvPr id="5" name="Untertitel 4"/>
+          <p:cNvSpPr>
+            <a:spLocks noGrp="1"/>
+          </p:cNvSpPr>
+          <p:nvPr>
+            <p:ph type="subTitle" idx="1"/>
+          </p:nvPr>
+        </p:nvSpPr>
+        <p:spPr/>
+        <p:txBody>
+          <a:bodyPr/>
+          <a:lstStyle/>
+          <a:p>
+            <a:endParaRPr lang="de-DE"/>
+          </a:p>
+        </p:txBody>
+      </p:sp>
+    </p:spTree>
+    <p:extLst>
+      <p:ext uri="{BB962C8B-B14F-4D97-AF65-F5344CB8AC3E}">
+        <p14:creationId xmlns:p14="http://schemas.microsoft.com/office/powerpoint/2010/main" val="2179771919"/>
       </p:ext>
     </p:extLst>
   </p:cSld>

</xml_diff>